<commit_message>
Synthetic data for hackthon
Synthetic data for hackthon
</commit_message>
<xml_diff>
--- a/gutenberg_books/pitch_deck.pptx
+++ b/gutenberg_books/pitch_deck.pptx
@@ -8,10 +8,6 @@
     <p:sldId id="256" r:id="rId7"/>
     <p:sldId id="257" r:id="rId8"/>
     <p:sldId id="258" r:id="rId9"/>
-    <p:sldId id="259" r:id="rId10"/>
-    <p:sldId id="260" r:id="rId11"/>
-    <p:sldId id="261" r:id="rId12"/>
-    <p:sldId id="262" r:id="rId13"/>
   </p:sldIdLst>
   <p:sldSz cx="9144000" cy="6858000" type="screen4x3"/>
   <p:notesSz cx="6858000" cy="9144000"/>
@@ -3131,12 +3127,7 @@
           <a:lstStyle/>
           <a:p>
             <a:r>
-              <a:t>Power Platform solution to optimize maintenance safety, reliability, and crew efficiency</a:t>
-            </a:r>
-          </a:p>
-          <a:p>
-            <a:r>
-              <a:t>Tools: Power BI · Power Automate · Copilot</a:t>
+              <a:t>PG&amp;E-style hackathon demo: dashboards • automations • ML</a:t>
             </a:r>
           </a:p>
         </p:txBody>
@@ -3175,45 +3166,59 @@
           <a:lstStyle/>
           <a:p>
             <a:r>
-              <a:t>The Problem</a:t>
-            </a:r>
-          </a:p>
-        </p:txBody>
-      </p:sp>
-      <p:sp>
-        <p:nvSpPr>
-          <p:cNvPr id="3" name="Content Placeholder 2"/>
-          <p:cNvSpPr>
-            <a:spLocks noGrp="1"/>
-          </p:cNvSpPr>
-          <p:nvPr>
-            <p:ph idx="1"/>
-          </p:nvPr>
-        </p:nvSpPr>
-        <p:spPr/>
-        <p:txBody>
-          <a:bodyPr/>
-          <a:lstStyle/>
-          <a:p>
-            <a:pPr/>
-            <a:r>
-              <a:t>Maintenance backlog increases safety &amp; regulatory risk</a:t>
-            </a:r>
-          </a:p>
-          <a:p>
-            <a:pPr/>
-            <a:r>
-              <a:t>Work is tracked in silos; prioritization is reactive</a:t>
-            </a:r>
-          </a:p>
-          <a:p>
-            <a:pPr/>
-            <a:r>
-              <a:t>Crew scheduling isn’t risk-aware; oversight lacks real-time view</a:t>
-            </a:r>
-          </a:p>
-        </p:txBody>
-      </p:sp>
+              <a:t>Bundling – Results (Sample Data)</a:t>
+            </a:r>
+          </a:p>
+        </p:txBody>
+      </p:sp>
+      <p:pic>
+        <p:nvPicPr>
+          <p:cNvPr id="3" name="Picture 2" descr="bundling_top_anchors.png"/>
+          <p:cNvPicPr>
+            <a:picLocks noChangeAspect="1"/>
+          </p:cNvPicPr>
+          <p:nvPr/>
+        </p:nvPicPr>
+        <p:blipFill>
+          <a:blip r:embed="rId2"/>
+          <a:stretch>
+            <a:fillRect/>
+          </a:stretch>
+        </p:blipFill>
+        <p:spPr>
+          <a:xfrm>
+            <a:off x="457200" y="1188720"/>
+            <a:ext cx="5852160" cy="2926080"/>
+          </a:xfrm>
+          <a:prstGeom prst="rect">
+            <a:avLst/>
+          </a:prstGeom>
+        </p:spPr>
+      </p:pic>
+      <p:pic>
+        <p:nvPicPr>
+          <p:cNvPr id="4" name="Picture 3" descr="bundling_priority_mix.png"/>
+          <p:cNvPicPr>
+            <a:picLocks noChangeAspect="1"/>
+          </p:cNvPicPr>
+          <p:nvPr/>
+        </p:nvPicPr>
+        <p:blipFill>
+          <a:blip r:embed="rId3"/>
+          <a:stretch>
+            <a:fillRect/>
+          </a:stretch>
+        </p:blipFill>
+        <p:spPr>
+          <a:xfrm>
+            <a:off x="5669280" y="1188720"/>
+            <a:ext cx="5120640" cy="2926080"/>
+          </a:xfrm>
+          <a:prstGeom prst="rect">
+            <a:avLst/>
+          </a:prstGeom>
+        </p:spPr>
+      </p:pic>
     </p:spTree>
   </p:cSld>
   <p:clrMapOvr>
@@ -3248,312 +3253,14 @@
           <a:lstStyle/>
           <a:p>
             <a:r>
-              <a:t>The Solution</a:t>
-            </a:r>
-          </a:p>
-        </p:txBody>
-      </p:sp>
-      <p:sp>
-        <p:nvSpPr>
-          <p:cNvPr id="3" name="Content Placeholder 2"/>
-          <p:cNvSpPr>
-            <a:spLocks noGrp="1"/>
-          </p:cNvSpPr>
-          <p:nvPr>
-            <p:ph idx="1"/>
-          </p:nvPr>
-        </p:nvSpPr>
-        <p:spPr/>
-        <p:txBody>
-          <a:bodyPr/>
-          <a:lstStyle/>
-          <a:p>
-            <a:pPr/>
-            <a:r>
-              <a:t>Power BI command center for overdue work &amp; risk</a:t>
-            </a:r>
-          </a:p>
-          <a:p>
-            <a:pPr/>
-            <a:r>
-              <a:t>Power Automate alerts &amp; escalations for high-risk cases</a:t>
-            </a:r>
-          </a:p>
-          <a:p>
-            <a:pPr/>
-            <a:r>
-              <a:t>Copilot Q&amp;A: natural-language insights and actions</a:t>
-            </a:r>
-          </a:p>
-        </p:txBody>
-      </p:sp>
-    </p:spTree>
-  </p:cSld>
-  <p:clrMapOvr>
-    <a:masterClrMapping/>
-  </p:clrMapOvr>
-</p:sld>
-</file>
-
-<file path=ppt/slides/slide4.xml><?xml version="1.0" encoding="utf-8"?>
-<p:sld xmlns:a="http://schemas.openxmlformats.org/drawingml/2006/main" xmlns:p="http://schemas.openxmlformats.org/presentationml/2006/main" xmlns:r="http://schemas.openxmlformats.org/officeDocument/2006/relationships">
-  <p:cSld>
-    <p:spTree>
-      <p:nvGrpSpPr>
-        <p:cNvPr id="1" name=""/>
-        <p:cNvGrpSpPr/>
-        <p:nvPr/>
-      </p:nvGrpSpPr>
-      <p:grpSpPr/>
-      <p:sp>
-        <p:nvSpPr>
-          <p:cNvPr id="2" name="Title 1"/>
-          <p:cNvSpPr>
-            <a:spLocks noGrp="1"/>
-          </p:cNvSpPr>
-          <p:nvPr>
-            <p:ph type="title"/>
-          </p:nvPr>
-        </p:nvSpPr>
-        <p:spPr/>
-        <p:txBody>
-          <a:bodyPr/>
-          <a:lstStyle/>
-          <a:p>
-            <a:r>
-              <a:t>Workflow Architecture</a:t>
-            </a:r>
-          </a:p>
-        </p:txBody>
-      </p:sp>
-      <p:sp>
-        <p:nvSpPr>
-          <p:cNvPr id="3" name="Content Placeholder 2"/>
-          <p:cNvSpPr>
-            <a:spLocks noGrp="1"/>
-          </p:cNvSpPr>
-          <p:nvPr>
-            <p:ph idx="1"/>
-          </p:nvPr>
-        </p:nvSpPr>
-        <p:spPr/>
-        <p:txBody>
-          <a:bodyPr/>
-          <a:lstStyle/>
-          <a:p>
-            <a:pPr/>
-            <a:r>
-              <a:t>Power BI: map, KPIs, risk &amp; overdue analytics</a:t>
-            </a:r>
-          </a:p>
-          <a:p>
-            <a:pPr/>
-            <a:r>
-              <a:t>Power Automate: Teams/email alerts, item updates</a:t>
-            </a:r>
-          </a:p>
-          <a:p>
-            <a:pPr/>
-            <a:r>
-              <a:t>Copilot: Ask 'Which substations have the highest risk this week?'</a:t>
-            </a:r>
-          </a:p>
-        </p:txBody>
-      </p:sp>
-    </p:spTree>
-  </p:cSld>
-  <p:clrMapOvr>
-    <a:masterClrMapping/>
-  </p:clrMapOvr>
-</p:sld>
-</file>
-
-<file path=ppt/slides/slide5.xml><?xml version="1.0" encoding="utf-8"?>
-<p:sld xmlns:a="http://schemas.openxmlformats.org/drawingml/2006/main" xmlns:p="http://schemas.openxmlformats.org/presentationml/2006/main" xmlns:r="http://schemas.openxmlformats.org/officeDocument/2006/relationships">
-  <p:cSld>
-    <p:spTree>
-      <p:nvGrpSpPr>
-        <p:cNvPr id="1" name=""/>
-        <p:cNvGrpSpPr/>
-        <p:nvPr/>
-      </p:nvGrpSpPr>
-      <p:grpSpPr/>
-      <p:sp>
-        <p:nvSpPr>
-          <p:cNvPr id="2" name="Title 1"/>
-          <p:cNvSpPr>
-            <a:spLocks noGrp="1"/>
-          </p:cNvSpPr>
-          <p:nvPr>
-            <p:ph type="title"/>
-          </p:nvPr>
-        </p:nvSpPr>
-        <p:spPr/>
-        <p:txBody>
-          <a:bodyPr/>
-          <a:lstStyle/>
-          <a:p>
-            <a:r>
-              <a:t>Value to PG&amp;E</a:t>
-            </a:r>
-          </a:p>
-        </p:txBody>
-      </p:sp>
-      <p:sp>
-        <p:nvSpPr>
-          <p:cNvPr id="3" name="Content Placeholder 2"/>
-          <p:cNvSpPr>
-            <a:spLocks noGrp="1"/>
-          </p:cNvSpPr>
-          <p:nvPr>
-            <p:ph idx="1"/>
-          </p:nvPr>
-        </p:nvSpPr>
-        <p:spPr/>
-        <p:txBody>
-          <a:bodyPr/>
-          <a:lstStyle/>
-          <a:p>
-            <a:pPr/>
-            <a:r>
-              <a:t>Faster repairs → fewer outages &amp; improved safety</a:t>
-            </a:r>
-          </a:p>
-          <a:p>
-            <a:pPr/>
-            <a:r>
-              <a:t>Lower regulatory risk via proactive tracking</a:t>
-            </a:r>
-          </a:p>
-          <a:p>
-            <a:pPr/>
-            <a:r>
-              <a:t>Optimized crew utilization and targeted dispatch</a:t>
-            </a:r>
-          </a:p>
-          <a:p>
-            <a:pPr/>
-            <a:r>
-              <a:t>Executive visibility with weekly auto-briefs</a:t>
-            </a:r>
-          </a:p>
-        </p:txBody>
-      </p:sp>
-    </p:spTree>
-  </p:cSld>
-  <p:clrMapOvr>
-    <a:masterClrMapping/>
-  </p:clrMapOvr>
-</p:sld>
-</file>
-
-<file path=ppt/slides/slide6.xml><?xml version="1.0" encoding="utf-8"?>
-<p:sld xmlns:a="http://schemas.openxmlformats.org/drawingml/2006/main" xmlns:p="http://schemas.openxmlformats.org/presentationml/2006/main" xmlns:r="http://schemas.openxmlformats.org/officeDocument/2006/relationships">
-  <p:cSld>
-    <p:spTree>
-      <p:nvGrpSpPr>
-        <p:cNvPr id="1" name=""/>
-        <p:cNvGrpSpPr/>
-        <p:nvPr/>
-      </p:nvGrpSpPr>
-      <p:grpSpPr/>
-      <p:sp>
-        <p:nvSpPr>
-          <p:cNvPr id="2" name="Title 1"/>
-          <p:cNvSpPr>
-            <a:spLocks noGrp="1"/>
-          </p:cNvSpPr>
-          <p:nvPr>
-            <p:ph type="title"/>
-          </p:nvPr>
-        </p:nvSpPr>
-        <p:spPr/>
-        <p:txBody>
-          <a:bodyPr/>
-          <a:lstStyle/>
-          <a:p>
-            <a:r>
-              <a:t>Next Steps</a:t>
-            </a:r>
-          </a:p>
-        </p:txBody>
-      </p:sp>
-      <p:sp>
-        <p:nvSpPr>
-          <p:cNvPr id="3" name="Content Placeholder 2"/>
-          <p:cNvSpPr>
-            <a:spLocks noGrp="1"/>
-          </p:cNvSpPr>
-          <p:nvPr>
-            <p:ph idx="1"/>
-          </p:nvPr>
-        </p:nvSpPr>
-        <p:spPr/>
-        <p:txBody>
-          <a:bodyPr/>
-          <a:lstStyle/>
-          <a:p>
-            <a:pPr/>
-            <a:r>
-              <a:t>Add wildfire overlays (weather, fuels, PSPS zones)</a:t>
-            </a:r>
-          </a:p>
-          <a:p>
-            <a:pPr/>
-            <a:r>
-              <a:t>Integrate predictive asset failure models</a:t>
-            </a:r>
-          </a:p>
-          <a:p>
-            <a:pPr/>
-            <a:r>
-              <a:t>Embed in Teams or mobile app for field crews</a:t>
-            </a:r>
-          </a:p>
-        </p:txBody>
-      </p:sp>
-    </p:spTree>
-  </p:cSld>
-  <p:clrMapOvr>
-    <a:masterClrMapping/>
-  </p:clrMapOvr>
-</p:sld>
-</file>
-
-<file path=ppt/slides/slide7.xml><?xml version="1.0" encoding="utf-8"?>
-<p:sld xmlns:a="http://schemas.openxmlformats.org/drawingml/2006/main" xmlns:p="http://schemas.openxmlformats.org/presentationml/2006/main" xmlns:r="http://schemas.openxmlformats.org/officeDocument/2006/relationships">
-  <p:cSld>
-    <p:spTree>
-      <p:nvGrpSpPr>
-        <p:cNvPr id="1" name=""/>
-        <p:cNvGrpSpPr/>
-        <p:nvPr/>
-      </p:nvGrpSpPr>
-      <p:grpSpPr/>
-      <p:sp>
-        <p:nvSpPr>
-          <p:cNvPr id="2" name="Title 1"/>
-          <p:cNvSpPr>
-            <a:spLocks noGrp="1"/>
-          </p:cNvSpPr>
-          <p:nvPr>
-            <p:ph type="title"/>
-          </p:nvPr>
-        </p:nvSpPr>
-        <p:spPr/>
-        <p:txBody>
-          <a:bodyPr/>
-          <a:lstStyle/>
-          <a:p>
-            <a:r>
-              <a:t>Power Automate – High-Risk Overdue Alert</a:t>
+              <a:t>Bundling – Teams Adaptive Card Approval Flow</a:t>
             </a:r>
           </a:p>
         </p:txBody>
       </p:sp>
       <p:pic>
         <p:nvPicPr>
-          <p:cNvPr id="3" name="Picture 2" descr="flow_diagram.png"/>
+          <p:cNvPr id="3" name="Picture 2" descr="bundle_approval_flow_diagram.png"/>
           <p:cNvPicPr>
             <a:picLocks noChangeAspect="1"/>
           </p:cNvPicPr>
@@ -3568,7 +3275,7 @@
         <p:spPr>
           <a:xfrm>
             <a:off x="914400" y="1554480"/>
-            <a:ext cx="6496050" cy="4114800"/>
+            <a:ext cx="8951440" cy="3840480"/>
           </a:xfrm>
           <a:prstGeom prst="rect">
             <a:avLst/>

</xml_diff>